<commit_message>
DOCS: Status Dinger verbessert
</commit_message>
<xml_diff>
--- a/documents/T3-ShareList-Statusbericht_v1.0.pptx
+++ b/documents/T3-ShareList-Statusbericht_v1.0.pptx
@@ -5858,7 +5858,7 @@
         <a:p>
           <a:r>
             <a:rPr lang="de-DE" dirty="0"/>
-            <a:t>Alles läuft planmäßig</a:t>
+            <a:t>Projekt in Schwierigkeiten</a:t>
           </a:r>
         </a:p>
       </dgm:t>
@@ -7480,7 +7480,7 @@
           </a:pPr>
           <a:r>
             <a:rPr lang="de-DE" sz="2500" kern="1200" dirty="0"/>
-            <a:t>Alles läuft planmäßig</a:t>
+            <a:t>Projekt in Schwierigkeiten</a:t>
           </a:r>
         </a:p>
       </dsp:txBody>
@@ -23142,7 +23142,7 @@
             <p:ph idx="1"/>
             <p:extLst>
               <p:ext uri="{D42A27DB-BD31-4B8C-83A1-F6EECF244321}">
-                <p14:modId xmlns:p14="http://schemas.microsoft.com/office/powerpoint/2010/main" val="4090634285"/>
+                <p14:modId xmlns:p14="http://schemas.microsoft.com/office/powerpoint/2010/main" val="2509415872"/>
               </p:ext>
             </p:extLst>
           </p:nvPr>

</xml_diff>